<commit_message>
Updated Power point and user documentation
</commit_message>
<xml_diff>
--- a/CapstonePowerPoint.pptx
+++ b/CapstonePowerPoint.pptx
@@ -1201,9 +1201,27 @@
       <dgm:spPr>
         <a:blipFill>
           <a:blip xmlns:r="http://schemas.openxmlformats.org/officeDocument/2006/relationships" r:embed="rId1">
+            <a:duotone>
+              <a:schemeClr val="accent2">
+                <a:hueOff val="0"/>
+                <a:satOff val="0"/>
+                <a:lumOff val="0"/>
+                <a:alphaOff val="0"/>
+                <a:shade val="20000"/>
+                <a:satMod val="200000"/>
+              </a:schemeClr>
+              <a:schemeClr val="accent2">
+                <a:hueOff val="0"/>
+                <a:satOff val="0"/>
+                <a:lumOff val="0"/>
+                <a:alphaOff val="0"/>
+                <a:tint val="12000"/>
+                <a:satMod val="190000"/>
+              </a:schemeClr>
+            </a:duotone>
             <a:extLst>
               <a:ext uri="{96DAC541-7B7A-43D3-8B79-37D633B846F1}">
-                <asvg:svgBlip xmlns:asvg="http://schemas.microsoft.com/office/drawing/2016/SVG/main" r:embed="rId2"/>
+                <asvg:svgBlip xmlns:asvg="http://schemas.microsoft.com/office/drawing/2016/SVG/main" xmlns="" r:embed="rId2"/>
               </a:ext>
             </a:extLst>
           </a:blip>
@@ -1227,6 +1245,13 @@
         </dgm:presLayoutVars>
       </dgm:prSet>
       <dgm:spPr/>
+      <dgm:t>
+        <a:bodyPr/>
+        <a:lstStyle/>
+        <a:p>
+          <a:endParaRPr lang="en-US"/>
+        </a:p>
+      </dgm:t>
     </dgm:pt>
     <dgm:pt modelId="{8B391436-B9B0-45BD-A57F-792D6376D868}" type="pres">
       <dgm:prSet presAssocID="{0C95B389-AC0C-4055-9AA3-38815EFC8B0A}" presName="sibTrans" presStyleCnt="0"/>
@@ -1241,9 +1266,27 @@
       <dgm:spPr>
         <a:blipFill>
           <a:blip xmlns:r="http://schemas.openxmlformats.org/officeDocument/2006/relationships" r:embed="rId3">
+            <a:duotone>
+              <a:schemeClr val="accent3">
+                <a:hueOff val="0"/>
+                <a:satOff val="0"/>
+                <a:lumOff val="0"/>
+                <a:alphaOff val="0"/>
+                <a:shade val="20000"/>
+                <a:satMod val="200000"/>
+              </a:schemeClr>
+              <a:schemeClr val="accent3">
+                <a:hueOff val="0"/>
+                <a:satOff val="0"/>
+                <a:lumOff val="0"/>
+                <a:alphaOff val="0"/>
+                <a:tint val="12000"/>
+                <a:satMod val="190000"/>
+              </a:schemeClr>
+            </a:duotone>
             <a:extLst>
               <a:ext uri="{96DAC541-7B7A-43D3-8B79-37D633B846F1}">
-                <asvg:svgBlip xmlns:asvg="http://schemas.microsoft.com/office/drawing/2016/SVG/main" r:embed="rId4"/>
+                <asvg:svgBlip xmlns:asvg="http://schemas.microsoft.com/office/drawing/2016/SVG/main" xmlns="" r:embed="rId4"/>
               </a:ext>
             </a:extLst>
           </a:blip>
@@ -1267,6 +1310,13 @@
         </dgm:presLayoutVars>
       </dgm:prSet>
       <dgm:spPr/>
+      <dgm:t>
+        <a:bodyPr/>
+        <a:lstStyle/>
+        <a:p>
+          <a:endParaRPr lang="en-US"/>
+        </a:p>
+      </dgm:t>
     </dgm:pt>
     <dgm:pt modelId="{F679C986-30E4-4F0A-A3A6-CAE528BFED76}" type="pres">
       <dgm:prSet presAssocID="{BFCE4A28-C381-46FF-935A-B11534EF7D87}" presName="sibTrans" presStyleCnt="0"/>
@@ -1281,9 +1331,27 @@
       <dgm:spPr>
         <a:blipFill>
           <a:blip xmlns:r="http://schemas.openxmlformats.org/officeDocument/2006/relationships" r:embed="rId5">
+            <a:duotone>
+              <a:schemeClr val="accent4">
+                <a:hueOff val="0"/>
+                <a:satOff val="0"/>
+                <a:lumOff val="0"/>
+                <a:alphaOff val="0"/>
+                <a:shade val="20000"/>
+                <a:satMod val="200000"/>
+              </a:schemeClr>
+              <a:schemeClr val="accent4">
+                <a:hueOff val="0"/>
+                <a:satOff val="0"/>
+                <a:lumOff val="0"/>
+                <a:alphaOff val="0"/>
+                <a:tint val="12000"/>
+                <a:satMod val="190000"/>
+              </a:schemeClr>
+            </a:duotone>
             <a:extLst>
               <a:ext uri="{96DAC541-7B7A-43D3-8B79-37D633B846F1}">
-                <asvg:svgBlip xmlns:asvg="http://schemas.microsoft.com/office/drawing/2016/SVG/main" r:embed="rId6"/>
+                <asvg:svgBlip xmlns:asvg="http://schemas.microsoft.com/office/drawing/2016/SVG/main" xmlns="" r:embed="rId6"/>
               </a:ext>
             </a:extLst>
           </a:blip>
@@ -1307,16 +1375,23 @@
         </dgm:presLayoutVars>
       </dgm:prSet>
       <dgm:spPr/>
+      <dgm:t>
+        <a:bodyPr/>
+        <a:lstStyle/>
+        <a:p>
+          <a:endParaRPr lang="en-US"/>
+        </a:p>
+      </dgm:t>
     </dgm:pt>
   </dgm:ptLst>
   <dgm:cxnLst>
+    <dgm:cxn modelId="{7F0DAB6F-9257-4F2D-B31A-3418F73F6952}" srcId="{7D9C16A6-8C48-4165-8DAF-8C957C12A8FA}" destId="{91A66877-AC1C-46D9-BF2C-6024B638DEA9}" srcOrd="1" destOrd="0" parTransId="{913FED05-DF41-48A7-B1F8-81937A468EF9}" sibTransId="{BFCE4A28-C381-46FF-935A-B11534EF7D87}"/>
+    <dgm:cxn modelId="{05A920DF-F275-442A-AE4E-321A812BD608}" type="presOf" srcId="{7D9C16A6-8C48-4165-8DAF-8C957C12A8FA}" destId="{8994D886-A75F-411A-A9D7-D31991FF12BD}" srcOrd="0" destOrd="0" presId="urn:microsoft.com/office/officeart/2018/2/layout/IconLabelList"/>
+    <dgm:cxn modelId="{C4BA385D-31ED-40EF-A5D6-98DFBA64E71A}" srcId="{7D9C16A6-8C48-4165-8DAF-8C957C12A8FA}" destId="{701D68F5-42F8-47BC-8FED-84C50F595DF0}" srcOrd="0" destOrd="0" parTransId="{9617668C-C38C-4017-8DDF-37855B15D110}" sibTransId="{0C95B389-AC0C-4055-9AA3-38815EFC8B0A}"/>
     <dgm:cxn modelId="{51C9C716-0C8A-4862-A43F-A9047F6A6ECE}" type="presOf" srcId="{701D68F5-42F8-47BC-8FED-84C50F595DF0}" destId="{A99B5DD6-89E9-4537-B415-4205CEB9323A}" srcOrd="0" destOrd="0" presId="urn:microsoft.com/office/officeart/2018/2/layout/IconLabelList"/>
-    <dgm:cxn modelId="{C4BA385D-31ED-40EF-A5D6-98DFBA64E71A}" srcId="{7D9C16A6-8C48-4165-8DAF-8C957C12A8FA}" destId="{701D68F5-42F8-47BC-8FED-84C50F595DF0}" srcOrd="0" destOrd="0" parTransId="{9617668C-C38C-4017-8DDF-37855B15D110}" sibTransId="{0C95B389-AC0C-4055-9AA3-38815EFC8B0A}"/>
+    <dgm:cxn modelId="{634ABEFF-3AC1-45CD-BF32-24D2F6D73D7C}" type="presOf" srcId="{76CC3289-2662-43F0-A3C6-BA04A135F08C}" destId="{133097FC-B1F8-4953-B0AB-E8E73D968D1C}" srcOrd="0" destOrd="0" presId="urn:microsoft.com/office/officeart/2018/2/layout/IconLabelList"/>
     <dgm:cxn modelId="{0400886E-8A1A-44C2-95A7-DB0EF4911494}" srcId="{7D9C16A6-8C48-4165-8DAF-8C957C12A8FA}" destId="{76CC3289-2662-43F0-A3C6-BA04A135F08C}" srcOrd="2" destOrd="0" parTransId="{D46DB4DA-1442-4ECE-89FE-BBB1E3489E3D}" sibTransId="{FA28C9D6-476E-43CD-BA23-D6D990FD78D0}"/>
-    <dgm:cxn modelId="{7F0DAB6F-9257-4F2D-B31A-3418F73F6952}" srcId="{7D9C16A6-8C48-4165-8DAF-8C957C12A8FA}" destId="{91A66877-AC1C-46D9-BF2C-6024B638DEA9}" srcOrd="1" destOrd="0" parTransId="{913FED05-DF41-48A7-B1F8-81937A468EF9}" sibTransId="{BFCE4A28-C381-46FF-935A-B11534EF7D87}"/>
     <dgm:cxn modelId="{639634AD-5727-49C2-9E58-EB6075215446}" type="presOf" srcId="{91A66877-AC1C-46D9-BF2C-6024B638DEA9}" destId="{55120873-6F5C-4053-8EAD-6287A7F1097E}" srcOrd="0" destOrd="0" presId="urn:microsoft.com/office/officeart/2018/2/layout/IconLabelList"/>
-    <dgm:cxn modelId="{05A920DF-F275-442A-AE4E-321A812BD608}" type="presOf" srcId="{7D9C16A6-8C48-4165-8DAF-8C957C12A8FA}" destId="{8994D886-A75F-411A-A9D7-D31991FF12BD}" srcOrd="0" destOrd="0" presId="urn:microsoft.com/office/officeart/2018/2/layout/IconLabelList"/>
-    <dgm:cxn modelId="{634ABEFF-3AC1-45CD-BF32-24D2F6D73D7C}" type="presOf" srcId="{76CC3289-2662-43F0-A3C6-BA04A135F08C}" destId="{133097FC-B1F8-4953-B0AB-E8E73D968D1C}" srcOrd="0" destOrd="0" presId="urn:microsoft.com/office/officeart/2018/2/layout/IconLabelList"/>
     <dgm:cxn modelId="{CF59BB9E-C8FC-4C34-8006-3277F29FB6DE}" type="presParOf" srcId="{8994D886-A75F-411A-A9D7-D31991FF12BD}" destId="{E1DBA6D5-BD14-4CD2-A0CC-80F867FEFA81}" srcOrd="0" destOrd="0" presId="urn:microsoft.com/office/officeart/2018/2/layout/IconLabelList"/>
     <dgm:cxn modelId="{866C03AD-DD5B-4277-8831-0C127DF86F35}" type="presParOf" srcId="{E1DBA6D5-BD14-4CD2-A0CC-80F867FEFA81}" destId="{19A8DC21-3E65-409D-AD53-DA51BB9198A0}" srcOrd="0" destOrd="0" presId="urn:microsoft.com/office/officeart/2018/2/layout/IconLabelList"/>
     <dgm:cxn modelId="{128FBF1B-109A-47F9-B440-D03F4626A9BA}" type="presParOf" srcId="{E1DBA6D5-BD14-4CD2-A0CC-80F867FEFA81}" destId="{B9F90A48-FF94-4C94-A587-0190406F6FD3}" srcOrd="1" destOrd="0" presId="urn:microsoft.com/office/officeart/2018/2/layout/IconLabelList"/>
@@ -1368,9 +1443,27 @@
         </a:prstGeom>
         <a:blipFill>
           <a:blip xmlns:r="http://schemas.openxmlformats.org/officeDocument/2006/relationships" r:embed="rId1">
+            <a:duotone>
+              <a:schemeClr val="accent2">
+                <a:hueOff val="0"/>
+                <a:satOff val="0"/>
+                <a:lumOff val="0"/>
+                <a:alphaOff val="0"/>
+                <a:shade val="20000"/>
+                <a:satMod val="200000"/>
+              </a:schemeClr>
+              <a:schemeClr val="accent2">
+                <a:hueOff val="0"/>
+                <a:satOff val="0"/>
+                <a:lumOff val="0"/>
+                <a:alphaOff val="0"/>
+                <a:tint val="12000"/>
+                <a:satMod val="190000"/>
+              </a:schemeClr>
+            </a:duotone>
             <a:extLst>
               <a:ext uri="{96DAC541-7B7A-43D3-8B79-37D633B846F1}">
-                <asvg:svgBlip xmlns:asvg="http://schemas.microsoft.com/office/drawing/2016/SVG/main" r:embed="rId2"/>
+                <asvg:svgBlip xmlns:asvg="http://schemas.microsoft.com/office/drawing/2016/SVG/main" xmlns="" r:embed="rId2"/>
               </a:ext>
             </a:extLst>
           </a:blip>
@@ -1442,7 +1535,7 @@
         </a:bodyPr>
         <a:lstStyle/>
         <a:p>
-          <a:pPr marL="0" lvl="0" indent="0" algn="ctr" defTabSz="1377950">
+          <a:pPr lvl="0" algn="ctr" defTabSz="1377950">
             <a:lnSpc>
               <a:spcPct val="100000"/>
             </a:lnSpc>
@@ -1452,7 +1545,6 @@
             <a:spcAft>
               <a:spcPct val="35000"/>
             </a:spcAft>
-            <a:buNone/>
           </a:pPr>
           <a:r>
             <a:rPr lang="en-ZA" sz="3100" kern="1200" dirty="0"/>
@@ -1481,9 +1573,27 @@
         </a:prstGeom>
         <a:blipFill>
           <a:blip xmlns:r="http://schemas.openxmlformats.org/officeDocument/2006/relationships" r:embed="rId3">
+            <a:duotone>
+              <a:schemeClr val="accent3">
+                <a:hueOff val="0"/>
+                <a:satOff val="0"/>
+                <a:lumOff val="0"/>
+                <a:alphaOff val="0"/>
+                <a:shade val="20000"/>
+                <a:satMod val="200000"/>
+              </a:schemeClr>
+              <a:schemeClr val="accent3">
+                <a:hueOff val="0"/>
+                <a:satOff val="0"/>
+                <a:lumOff val="0"/>
+                <a:alphaOff val="0"/>
+                <a:tint val="12000"/>
+                <a:satMod val="190000"/>
+              </a:schemeClr>
+            </a:duotone>
             <a:extLst>
               <a:ext uri="{96DAC541-7B7A-43D3-8B79-37D633B846F1}">
-                <asvg:svgBlip xmlns:asvg="http://schemas.microsoft.com/office/drawing/2016/SVG/main" r:embed="rId4"/>
+                <asvg:svgBlip xmlns:asvg="http://schemas.microsoft.com/office/drawing/2016/SVG/main" xmlns="" r:embed="rId4"/>
               </a:ext>
             </a:extLst>
           </a:blip>
@@ -1555,7 +1665,7 @@
         </a:bodyPr>
         <a:lstStyle/>
         <a:p>
-          <a:pPr marL="0" lvl="0" indent="0" algn="ctr" defTabSz="1377950">
+          <a:pPr lvl="0" algn="ctr" defTabSz="1377950">
             <a:lnSpc>
               <a:spcPct val="100000"/>
             </a:lnSpc>
@@ -1565,7 +1675,6 @@
             <a:spcAft>
               <a:spcPct val="35000"/>
             </a:spcAft>
-            <a:buNone/>
           </a:pPr>
           <a:r>
             <a:rPr lang="en-US" sz="3100" kern="1200" dirty="0"/>
@@ -1593,9 +1702,27 @@
         </a:prstGeom>
         <a:blipFill>
           <a:blip xmlns:r="http://schemas.openxmlformats.org/officeDocument/2006/relationships" r:embed="rId5">
+            <a:duotone>
+              <a:schemeClr val="accent4">
+                <a:hueOff val="0"/>
+                <a:satOff val="0"/>
+                <a:lumOff val="0"/>
+                <a:alphaOff val="0"/>
+                <a:shade val="20000"/>
+                <a:satMod val="200000"/>
+              </a:schemeClr>
+              <a:schemeClr val="accent4">
+                <a:hueOff val="0"/>
+                <a:satOff val="0"/>
+                <a:lumOff val="0"/>
+                <a:alphaOff val="0"/>
+                <a:tint val="12000"/>
+                <a:satMod val="190000"/>
+              </a:schemeClr>
+            </a:duotone>
             <a:extLst>
               <a:ext uri="{96DAC541-7B7A-43D3-8B79-37D633B846F1}">
-                <asvg:svgBlip xmlns:asvg="http://schemas.microsoft.com/office/drawing/2016/SVG/main" r:embed="rId6"/>
+                <asvg:svgBlip xmlns:asvg="http://schemas.microsoft.com/office/drawing/2016/SVG/main" xmlns="" r:embed="rId6"/>
               </a:ext>
             </a:extLst>
           </a:blip>
@@ -1667,7 +1794,7 @@
         </a:bodyPr>
         <a:lstStyle/>
         <a:p>
-          <a:pPr marL="0" lvl="0" indent="0" algn="ctr" defTabSz="1377950">
+          <a:pPr lvl="0" algn="ctr" defTabSz="1377950">
             <a:lnSpc>
               <a:spcPct val="100000"/>
             </a:lnSpc>
@@ -1677,7 +1804,6 @@
             <a:spcAft>
               <a:spcPct val="35000"/>
             </a:spcAft>
-            <a:buNone/>
           </a:pPr>
           <a:r>
             <a:rPr lang="en-US" sz="3100" kern="1200" dirty="0" err="1"/>
@@ -1876,7 +2002,7 @@
   </dgm:layoutNode>
   <dgm:extLst>
     <a:ext uri="{68A01E43-0DF5-4B5B-8FA6-DAF915123BFB}">
-      <dgm1612:lstStyle xmlns:dgm1612="http://schemas.microsoft.com/office/drawing/2016/12/diagram">
+      <dgm1612:lstStyle xmlns:dgm1612="http://schemas.microsoft.com/office/drawing/2016/12/diagram" xmlns="">
         <a:lvl1pPr>
           <a:lnSpc>
             <a:spcPct val="100000"/>
@@ -3004,7 +3130,7 @@
           <a:p>
             <a:fld id="{32B623FB-F82A-4510-A170-0D5E7C854AA3}" type="datetimeFigureOut">
               <a:rPr lang="en-CA" smtClean="0"/>
-              <a:t>2019-04-10</a:t>
+              <a:t>2019-04-11</a:t>
             </a:fld>
             <a:endParaRPr lang="en-CA"/>
           </a:p>
@@ -4038,7 +4164,7 @@
             <a:fld id="{B61BEF0D-F0BB-DE4B-95CE-6DB70DBA9567}" type="datetimeFigureOut">
               <a:rPr lang="en-US" smtClean="0"/>
               <a:pPr/>
-              <a:t>4/10/2019</a:t>
+              <a:t>4/11/2019</a:t>
             </a:fld>
             <a:endParaRPr lang="en-US" dirty="0"/>
           </a:p>
@@ -4302,7 +4428,7 @@
             <a:fld id="{B61BEF0D-F0BB-DE4B-95CE-6DB70DBA9567}" type="datetimeFigureOut">
               <a:rPr lang="en-US" smtClean="0"/>
               <a:pPr/>
-              <a:t>4/10/2019</a:t>
+              <a:t>4/11/2019</a:t>
             </a:fld>
             <a:endParaRPr lang="en-US" dirty="0"/>
           </a:p>
@@ -4539,7 +4665,7 @@
             <a:fld id="{B61BEF0D-F0BB-DE4B-95CE-6DB70DBA9567}" type="datetimeFigureOut">
               <a:rPr lang="en-US" smtClean="0"/>
               <a:pPr/>
-              <a:t>4/10/2019</a:t>
+              <a:t>4/11/2019</a:t>
             </a:fld>
             <a:endParaRPr lang="en-US" dirty="0"/>
           </a:p>
@@ -4781,7 +4907,7 @@
             <a:fld id="{B61BEF0D-F0BB-DE4B-95CE-6DB70DBA9567}" type="datetimeFigureOut">
               <a:rPr lang="en-US" smtClean="0"/>
               <a:pPr/>
-              <a:t>4/10/2019</a:t>
+              <a:t>4/11/2019</a:t>
             </a:fld>
             <a:endParaRPr lang="en-US" dirty="0"/>
           </a:p>
@@ -5090,7 +5216,7 @@
             <a:fld id="{B61BEF0D-F0BB-DE4B-95CE-6DB70DBA9567}" type="datetimeFigureOut">
               <a:rPr lang="en-US" smtClean="0"/>
               <a:pPr/>
-              <a:t>4/10/2019</a:t>
+              <a:t>4/11/2019</a:t>
             </a:fld>
             <a:endParaRPr lang="en-US" dirty="0"/>
           </a:p>
@@ -5394,7 +5520,7 @@
             <a:fld id="{B61BEF0D-F0BB-DE4B-95CE-6DB70DBA9567}" type="datetimeFigureOut">
               <a:rPr lang="en-US" smtClean="0"/>
               <a:pPr/>
-              <a:t>4/10/2019</a:t>
+              <a:t>4/11/2019</a:t>
             </a:fld>
             <a:endParaRPr lang="en-US" dirty="0"/>
           </a:p>
@@ -5818,7 +5944,7 @@
             <a:fld id="{B61BEF0D-F0BB-DE4B-95CE-6DB70DBA9567}" type="datetimeFigureOut">
               <a:rPr lang="en-US" smtClean="0"/>
               <a:pPr/>
-              <a:t>4/10/2019</a:t>
+              <a:t>4/11/2019</a:t>
             </a:fld>
             <a:endParaRPr lang="en-US" dirty="0"/>
           </a:p>
@@ -5915,7 +6041,7 @@
             <a:fld id="{B61BEF0D-F0BB-DE4B-95CE-6DB70DBA9567}" type="datetimeFigureOut">
               <a:rPr lang="en-US" smtClean="0"/>
               <a:pPr/>
-              <a:t>4/10/2019</a:t>
+              <a:t>4/11/2019</a:t>
             </a:fld>
             <a:endParaRPr lang="en-US" dirty="0"/>
           </a:p>
@@ -6079,7 +6205,7 @@
             <a:fld id="{B61BEF0D-F0BB-DE4B-95CE-6DB70DBA9567}" type="datetimeFigureOut">
               <a:rPr lang="en-US" smtClean="0"/>
               <a:pPr/>
-              <a:t>4/10/2019</a:t>
+              <a:t>4/11/2019</a:t>
             </a:fld>
             <a:endParaRPr lang="en-US" dirty="0"/>
           </a:p>
@@ -6459,7 +6585,7 @@
             <a:fld id="{B61BEF0D-F0BB-DE4B-95CE-6DB70DBA9567}" type="datetimeFigureOut">
               <a:rPr lang="en-US" smtClean="0"/>
               <a:pPr/>
-              <a:t>4/10/2019</a:t>
+              <a:t>4/11/2019</a:t>
             </a:fld>
             <a:endParaRPr lang="en-US" dirty="0"/>
           </a:p>
@@ -6750,7 +6876,7 @@
             <a:fld id="{B61BEF0D-F0BB-DE4B-95CE-6DB70DBA9567}" type="datetimeFigureOut">
               <a:rPr lang="en-US" smtClean="0"/>
               <a:pPr/>
-              <a:t>4/10/2019</a:t>
+              <a:t>4/11/2019</a:t>
             </a:fld>
             <a:endParaRPr lang="en-US" dirty="0"/>
           </a:p>
@@ -6963,7 +7089,7 @@
             <a:fld id="{B61BEF0D-F0BB-DE4B-95CE-6DB70DBA9567}" type="datetimeFigureOut">
               <a:rPr lang="en-US" smtClean="0"/>
               <a:pPr/>
-              <a:t>4/10/2019</a:t>
+              <a:t>4/11/2019</a:t>
             </a:fld>
             <a:endParaRPr lang="en-US" dirty="0"/>
           </a:p>
@@ -7688,6 +7814,13 @@
   <p:clrMapOvr>
     <a:masterClrMapping/>
   </p:clrMapOvr>
+  <p:timing>
+    <p:tnLst>
+      <p:par>
+        <p:cTn id="1" dur="indefinite" restart="never" nodeType="tmRoot"/>
+      </p:par>
+    </p:tnLst>
+  </p:timing>
 </p:sld>
 </file>
 
@@ -7879,6 +8012,13 @@
   <p:clrMapOvr>
     <a:masterClrMapping/>
   </p:clrMapOvr>
+  <p:timing>
+    <p:tnLst>
+      <p:par>
+        <p:cTn id="1" dur="indefinite" restart="never" nodeType="tmRoot"/>
+      </p:par>
+    </p:tnLst>
+  </p:timing>
 </p:sld>
 </file>
 
@@ -8121,6 +8261,13 @@
   <p:clrMapOvr>
     <a:masterClrMapping/>
   </p:clrMapOvr>
+  <p:timing>
+    <p:tnLst>
+      <p:par>
+        <p:cTn id="1" dur="indefinite" restart="never" nodeType="tmRoot"/>
+      </p:par>
+    </p:tnLst>
+  </p:timing>
 </p:sld>
 </file>
 
@@ -9506,6 +9653,13 @@
   <p:clrMapOvr>
     <a:masterClrMapping/>
   </p:clrMapOvr>
+  <p:timing>
+    <p:tnLst>
+      <p:par>
+        <p:cTn id="1" dur="indefinite" restart="never" nodeType="tmRoot"/>
+      </p:par>
+    </p:tnLst>
+  </p:timing>
 </p:sld>
 </file>
 
@@ -9542,7 +9696,7 @@
                 <a16:creationId xmlns:a16="http://schemas.microsoft.com/office/drawing/2014/main" id="{493D4EDA-58E0-40CC-B3CA-14CDEB349D24}"/>
               </a:ext>
               <a:ext uri="{C183D7F6-B498-43B3-948B-1728B52AA6E4}">
-                <adec:decorative xmlns:adec="http://schemas.microsoft.com/office/drawing/2017/decorative" val="1"/>
+                <adec:decorative xmlns:adec="http://schemas.microsoft.com/office/drawing/2017/decorative" xmlns="" val="1"/>
               </a:ext>
             </a:extLst>
           </p:cNvPr>
@@ -9637,7 +9791,7 @@
                 <a16:creationId xmlns:a16="http://schemas.microsoft.com/office/drawing/2014/main" id="{AA9EB0BC-A85E-4C26-B355-5DFCEF6CCB49}"/>
               </a:ext>
               <a:ext uri="{C183D7F6-B498-43B3-948B-1728B52AA6E4}">
-                <adec:decorative xmlns:adec="http://schemas.microsoft.com/office/drawing/2017/decorative" val="1"/>
+                <adec:decorative xmlns:adec="http://schemas.microsoft.com/office/drawing/2017/decorative" xmlns="" val="1"/>
               </a:ext>
             </a:extLst>
           </p:cNvPr>
@@ -9668,7 +9822,7 @@
                   <a16:creationId xmlns:a16="http://schemas.microsoft.com/office/drawing/2014/main" id="{3643E56B-BD42-413D-B17D-7958270F5DE4}"/>
                 </a:ext>
                 <a:ext uri="{C183D7F6-B498-43B3-948B-1728B52AA6E4}">
-                  <adec:decorative xmlns:adec="http://schemas.microsoft.com/office/drawing/2017/decorative" val="1"/>
+                  <adec:decorative xmlns:adec="http://schemas.microsoft.com/office/drawing/2017/decorative" xmlns="" val="1"/>
                 </a:ext>
               </a:extLst>
             </p:cNvPr>
@@ -9720,7 +9874,7 @@
                   <a16:creationId xmlns:a16="http://schemas.microsoft.com/office/drawing/2014/main" id="{96C04F74-9467-4FA5-95DC-8D481A29740E}"/>
                 </a:ext>
                 <a:ext uri="{C183D7F6-B498-43B3-948B-1728B52AA6E4}">
-                  <adec:decorative xmlns:adec="http://schemas.microsoft.com/office/drawing/2017/decorative" val="1"/>
+                  <adec:decorative xmlns:adec="http://schemas.microsoft.com/office/drawing/2017/decorative" xmlns="" val="1"/>
                 </a:ext>
               </a:extLst>
             </p:cNvPr>
@@ -9772,7 +9926,7 @@
                   <a16:creationId xmlns:a16="http://schemas.microsoft.com/office/drawing/2014/main" id="{D73DE1C3-5C37-42E9-A3F0-256F1938327C}"/>
                 </a:ext>
                 <a:ext uri="{C183D7F6-B498-43B3-948B-1728B52AA6E4}">
-                  <adec:decorative xmlns:adec="http://schemas.microsoft.com/office/drawing/2017/decorative" val="1"/>
+                  <adec:decorative xmlns:adec="http://schemas.microsoft.com/office/drawing/2017/decorative" xmlns="" val="1"/>
                 </a:ext>
               </a:extLst>
             </p:cNvPr>
@@ -9825,7 +9979,7 @@
                 <a16:creationId xmlns:a16="http://schemas.microsoft.com/office/drawing/2014/main" id="{4A2E7EC3-E07C-46CE-9B25-41865A50681C}"/>
               </a:ext>
               <a:ext uri="{C183D7F6-B498-43B3-948B-1728B52AA6E4}">
-                <adec:decorative xmlns:adec="http://schemas.microsoft.com/office/drawing/2017/decorative" val="1"/>
+                <adec:decorative xmlns:adec="http://schemas.microsoft.com/office/drawing/2017/decorative" xmlns="" val="1"/>
               </a:ext>
             </a:extLst>
           </p:cNvPr>
@@ -9951,6 +10105,28 @@
           </a:p>
         </p:txBody>
       </p:sp>
+      <p:pic>
+        <p:nvPicPr>
+          <p:cNvPr id="11" name="Picture 10"/>
+          <p:cNvPicPr/>
+          <p:nvPr/>
+        </p:nvPicPr>
+        <p:blipFill>
+          <a:blip r:embed="rId4"/>
+          <a:stretch>
+            <a:fillRect/>
+          </a:stretch>
+        </p:blipFill>
+        <p:spPr>
+          <a:xfrm>
+            <a:off x="1963782" y="661155"/>
+            <a:ext cx="8259415" cy="3694945"/>
+          </a:xfrm>
+          <a:prstGeom prst="rect">
+            <a:avLst/>
+          </a:prstGeom>
+        </p:spPr>
+      </p:pic>
     </p:spTree>
     <p:extLst>
       <p:ext uri="{BB962C8B-B14F-4D97-AF65-F5344CB8AC3E}">
@@ -9961,6 +10137,13 @@
   <p:clrMapOvr>
     <a:masterClrMapping/>
   </p:clrMapOvr>
+  <p:timing>
+    <p:tnLst>
+      <p:par>
+        <p:cTn id="1" dur="indefinite" restart="never" nodeType="tmRoot"/>
+      </p:par>
+    </p:tnLst>
+  </p:timing>
 </p:sld>
 </file>
 
@@ -9997,7 +10180,7 @@
                 <a16:creationId xmlns:a16="http://schemas.microsoft.com/office/drawing/2014/main" id="{379F11E2-8BA5-4C5C-AE7C-361E5EA011FF}"/>
               </a:ext>
               <a:ext uri="{C183D7F6-B498-43B3-948B-1728B52AA6E4}">
-                <adec:decorative xmlns:adec="http://schemas.microsoft.com/office/drawing/2017/decorative" val="1"/>
+                <adec:decorative xmlns:adec="http://schemas.microsoft.com/office/drawing/2017/decorative" xmlns="" val="1"/>
               </a:ext>
             </a:extLst>
           </p:cNvPr>
@@ -10092,7 +10275,7 @@
                 <a16:creationId xmlns:a16="http://schemas.microsoft.com/office/drawing/2014/main" id="{7C00E1DA-EC7C-40FC-95E3-11FDCD2E4291}"/>
               </a:ext>
               <a:ext uri="{C183D7F6-B498-43B3-948B-1728B52AA6E4}">
-                <adec:decorative xmlns:adec="http://schemas.microsoft.com/office/drawing/2017/decorative" val="1"/>
+                <adec:decorative xmlns:adec="http://schemas.microsoft.com/office/drawing/2017/decorative" xmlns="" val="1"/>
               </a:ext>
             </a:extLst>
           </p:cNvPr>
@@ -10235,7 +10418,7 @@
                 <a16:creationId xmlns:a16="http://schemas.microsoft.com/office/drawing/2014/main" id="{9A421166-2996-41A7-B094-AE5316F347DD}"/>
               </a:ext>
               <a:ext uri="{C183D7F6-B498-43B3-948B-1728B52AA6E4}">
-                <adec:decorative xmlns:adec="http://schemas.microsoft.com/office/drawing/2017/decorative" val="1"/>
+                <adec:decorative xmlns:adec="http://schemas.microsoft.com/office/drawing/2017/decorative" xmlns="" val="1"/>
               </a:ext>
             </a:extLst>
           </p:cNvPr>
@@ -10266,7 +10449,7 @@
                   <a16:creationId xmlns:a16="http://schemas.microsoft.com/office/drawing/2014/main" id="{FDBB1B92-A3EB-43E4-8FAB-D20E8ED14CEF}"/>
                 </a:ext>
                 <a:ext uri="{C183D7F6-B498-43B3-948B-1728B52AA6E4}">
-                  <adec:decorative xmlns:adec="http://schemas.microsoft.com/office/drawing/2017/decorative" val="1"/>
+                  <adec:decorative xmlns:adec="http://schemas.microsoft.com/office/drawing/2017/decorative" xmlns="" val="1"/>
                 </a:ext>
               </a:extLst>
             </p:cNvPr>
@@ -10318,7 +10501,7 @@
                   <a16:creationId xmlns:a16="http://schemas.microsoft.com/office/drawing/2014/main" id="{3F3972F4-FE7E-48EA-AAD8-9BE5750A6672}"/>
                 </a:ext>
                 <a:ext uri="{C183D7F6-B498-43B3-948B-1728B52AA6E4}">
-                  <adec:decorative xmlns:adec="http://schemas.microsoft.com/office/drawing/2017/decorative" val="1"/>
+                  <adec:decorative xmlns:adec="http://schemas.microsoft.com/office/drawing/2017/decorative" xmlns="" val="1"/>
                 </a:ext>
               </a:extLst>
             </p:cNvPr>
@@ -10370,7 +10553,7 @@
                   <a16:creationId xmlns:a16="http://schemas.microsoft.com/office/drawing/2014/main" id="{221614E5-870B-4D5E-A43B-8FF7E5323484}"/>
                 </a:ext>
                 <a:ext uri="{C183D7F6-B498-43B3-948B-1728B52AA6E4}">
-                  <adec:decorative xmlns:adec="http://schemas.microsoft.com/office/drawing/2017/decorative" val="1"/>
+                  <adec:decorative xmlns:adec="http://schemas.microsoft.com/office/drawing/2017/decorative" xmlns="" val="1"/>
                 </a:ext>
               </a:extLst>
             </p:cNvPr>
@@ -10993,11 +11176,12 @@
 </file>
 
 <file path=customXml/item1.xml><?xml version="1.0" encoding="utf-8"?>
-<p:properties xmlns:p="http://schemas.microsoft.com/office/2006/metadata/properties" xmlns:xsi="http://www.w3.org/2001/XMLSchema-instance" xmlns:pc="http://schemas.microsoft.com/office/infopath/2007/PartnerControls">
-  <documentManagement>
-    <MediaServiceKeyPoints xmlns="71af3243-3dd4-4a8d-8c0d-dd76da1f02a5" xsi:nil="true"/>
-  </documentManagement>
-</p:properties>
+<?mso-contentType ?>
+<FormTemplates xmlns="http://schemas.microsoft.com/sharepoint/v3/contenttype/forms">
+  <Display>DocumentLibraryForm</Display>
+  <Edit>DocumentLibraryForm</Edit>
+  <New>DocumentLibraryForm</New>
+</FormTemplates>
 </file>
 
 <file path=customXml/item2.xml><?xml version="1.0" encoding="utf-8"?>
@@ -11212,20 +11396,17 @@
 </file>
 
 <file path=customXml/item3.xml><?xml version="1.0" encoding="utf-8"?>
-<?mso-contentType ?>
-<FormTemplates xmlns="http://schemas.microsoft.com/sharepoint/v3/contenttype/forms">
-  <Display>DocumentLibraryForm</Display>
-  <Edit>DocumentLibraryForm</Edit>
-  <New>DocumentLibraryForm</New>
-</FormTemplates>
+<p:properties xmlns:p="http://schemas.microsoft.com/office/2006/metadata/properties" xmlns:xsi="http://www.w3.org/2001/XMLSchema-instance" xmlns:pc="http://schemas.microsoft.com/office/infopath/2007/PartnerControls">
+  <documentManagement>
+    <MediaServiceKeyPoints xmlns="71af3243-3dd4-4a8d-8c0d-dd76da1f02a5" xsi:nil="true"/>
+  </documentManagement>
+</p:properties>
 </file>
 
 <file path=customXml/itemProps1.xml><?xml version="1.0" encoding="utf-8"?>
-<ds:datastoreItem xmlns:ds="http://schemas.openxmlformats.org/officeDocument/2006/customXml" ds:itemID="{1EBC12AA-1C15-4500-BC9C-8EE83A441DE9}">
+<ds:datastoreItem xmlns:ds="http://schemas.openxmlformats.org/officeDocument/2006/customXml" ds:itemID="{BA0CF3B2-1F0F-4FC5-8002-3E4869ABAD55}">
   <ds:schemaRefs>
-    <ds:schemaRef ds:uri="http://schemas.microsoft.com/office/2006/metadata/properties"/>
-    <ds:schemaRef ds:uri="http://schemas.microsoft.com/office/infopath/2007/PartnerControls"/>
-    <ds:schemaRef ds:uri="71af3243-3dd4-4a8d-8c0d-dd76da1f02a5"/>
+    <ds:schemaRef ds:uri="http://schemas.microsoft.com/sharepoint/v3/contenttype/forms"/>
   </ds:schemaRefs>
 </ds:datastoreItem>
 </file>
@@ -11250,9 +11431,11 @@
 </file>
 
 <file path=customXml/itemProps3.xml><?xml version="1.0" encoding="utf-8"?>
-<ds:datastoreItem xmlns:ds="http://schemas.openxmlformats.org/officeDocument/2006/customXml" ds:itemID="{BA0CF3B2-1F0F-4FC5-8002-3E4869ABAD55}">
+<ds:datastoreItem xmlns:ds="http://schemas.openxmlformats.org/officeDocument/2006/customXml" ds:itemID="{1EBC12AA-1C15-4500-BC9C-8EE83A441DE9}">
   <ds:schemaRefs>
-    <ds:schemaRef ds:uri="http://schemas.microsoft.com/sharepoint/v3/contenttype/forms"/>
+    <ds:schemaRef ds:uri="http://schemas.microsoft.com/office/2006/metadata/properties"/>
+    <ds:schemaRef ds:uri="http://schemas.microsoft.com/office/infopath/2007/PartnerControls"/>
+    <ds:schemaRef ds:uri="71af3243-3dd4-4a8d-8c0d-dd76da1f02a5"/>
   </ds:schemaRefs>
 </ds:datastoreItem>
 </file>
</xml_diff>